<commit_message>
Added Maybe Type and Honest Square
</commit_message>
<xml_diff>
--- a/data/Towards Functional Programming.pptx
+++ b/data/Towards Functional Programming.pptx
@@ -123,6 +123,22 @@
       </a:defRPr>
     </a:lvl9pPr>
   </p:defaultTextStyle>
+  <p:extLst>
+    <p:ext uri="{EFAFB233-063F-42B5-8137-9DF3F51BA10A}">
+      <p15:sldGuideLst xmlns:p15="http://schemas.microsoft.com/office/powerpoint/2012/main">
+        <p15:guide id="1" orient="horz" pos="2160">
+          <p15:clr>
+            <a:srgbClr val="A4A3A4"/>
+          </p15:clr>
+        </p15:guide>
+        <p15:guide id="2" pos="2880">
+          <p15:clr>
+            <a:srgbClr val="A4A3A4"/>
+          </p15:clr>
+        </p15:guide>
+      </p15:sldGuideLst>
+    </p:ext>
+  </p:extLst>
 </p:presentation>
 </file>
 
@@ -208,7 +224,7 @@
           <a:p>
             <a:fld id="{9A29CC91-A8A7-4614-81AD-07C513CEB92B}" type="datetimeFigureOut">
               <a:rPr lang="en-AU" smtClean="0"/>
-              <a:t>23/04/2017</a:t>
+              <a:t>24/04/2017</a:t>
             </a:fld>
             <a:endParaRPr lang="en-AU"/>
           </a:p>
@@ -272,35 +288,35 @@
           <a:p>
             <a:pPr lvl="0"/>
             <a:r>
-              <a:rPr lang="en-US" smtClean="0"/>
+              <a:rPr lang="en-US"/>
               <a:t>Click to edit Master text styles</a:t>
             </a:r>
           </a:p>
           <a:p>
             <a:pPr lvl="1"/>
             <a:r>
-              <a:rPr lang="en-US" smtClean="0"/>
+              <a:rPr lang="en-US"/>
               <a:t>Second level</a:t>
             </a:r>
           </a:p>
           <a:p>
             <a:pPr lvl="2"/>
             <a:r>
-              <a:rPr lang="en-US" smtClean="0"/>
+              <a:rPr lang="en-US"/>
               <a:t>Third level</a:t>
             </a:r>
           </a:p>
           <a:p>
             <a:pPr lvl="3"/>
             <a:r>
-              <a:rPr lang="en-US" smtClean="0"/>
+              <a:rPr lang="en-US"/>
               <a:t>Fourth level</a:t>
             </a:r>
           </a:p>
           <a:p>
             <a:pPr lvl="4"/>
             <a:r>
-              <a:rPr lang="en-US" smtClean="0"/>
+              <a:rPr lang="en-US"/>
               <a:t>Fifth level</a:t>
             </a:r>
             <a:endParaRPr lang="en-AU"/>
@@ -524,7 +540,7 @@
               <a:buAutoNum type="arabicPeriod"/>
             </a:pPr>
             <a:r>
-              <a:rPr lang="en-AU" baseline="0" dirty="0" smtClean="0"/>
+              <a:rPr lang="en-AU" baseline="0" dirty="0"/>
               <a:t>Increased readability reduces ambiguity – it is concise and there is nothing here that does not relate to the function </a:t>
             </a:r>
           </a:p>
@@ -533,7 +549,7 @@
               <a:buAutoNum type="arabicPeriod"/>
             </a:pPr>
             <a:r>
-              <a:rPr lang="en-AU" baseline="0" dirty="0" smtClean="0"/>
+              <a:rPr lang="en-AU" baseline="0" dirty="0"/>
               <a:t>Describes what it does and says how it does it.</a:t>
             </a:r>
           </a:p>
@@ -542,7 +558,7 @@
               <a:buAutoNum type="arabicPeriod"/>
             </a:pPr>
             <a:r>
-              <a:rPr lang="en-AU" baseline="0" dirty="0" smtClean="0"/>
+              <a:rPr lang="en-AU" baseline="0" dirty="0"/>
               <a:t>Function itself only does the one thing it is asked to do.</a:t>
             </a:r>
           </a:p>
@@ -551,7 +567,7 @@
               <a:buAutoNum type="arabicPeriod"/>
             </a:pPr>
             <a:r>
-              <a:rPr lang="en-AU" baseline="0" dirty="0" smtClean="0"/>
+              <a:rPr lang="en-AU" baseline="0" dirty="0"/>
               <a:t>Removes the GOTO semantics – exceptions should not control program flow.</a:t>
             </a:r>
           </a:p>
@@ -559,14 +575,14 @@
             <a:pPr marL="228600" indent="-228600">
               <a:buAutoNum type="arabicPeriod"/>
             </a:pPr>
-            <a:endParaRPr lang="en-AU" baseline="0" dirty="0" smtClean="0"/>
+            <a:endParaRPr lang="en-AU" baseline="0" dirty="0"/>
           </a:p>
           <a:p>
             <a:pPr marL="0" indent="0">
               <a:buNone/>
             </a:pPr>
             <a:r>
-              <a:rPr lang="en-AU" baseline="0" dirty="0" smtClean="0"/>
+              <a:rPr lang="en-AU" baseline="0" dirty="0"/>
               <a:t>It might cause other things to happen but that is because it is a “Higher Order” function which is a result of composition.</a:t>
             </a:r>
           </a:p>
@@ -574,30 +590,30 @@
             <a:pPr marL="228600" indent="-228600">
               <a:buAutoNum type="arabicPeriod"/>
             </a:pPr>
-            <a:endParaRPr lang="en-AU" baseline="0" dirty="0" smtClean="0"/>
+            <a:endParaRPr lang="en-AU" baseline="0" dirty="0"/>
           </a:p>
           <a:p>
             <a:pPr marL="0" indent="0">
               <a:buNone/>
             </a:pPr>
             <a:r>
-              <a:rPr lang="en-AU" baseline="0" dirty="0" smtClean="0"/>
+              <a:rPr lang="en-AU" baseline="0" dirty="0"/>
               <a:t>The </a:t>
             </a:r>
             <a:r>
-              <a:rPr lang="en-AU" baseline="0" dirty="0" err="1" smtClean="0"/>
+              <a:rPr lang="en-AU" baseline="0" dirty="0" err="1"/>
               <a:t>Goto</a:t>
             </a:r>
             <a:r>
-              <a:rPr lang="en-AU" baseline="0" dirty="0" smtClean="0"/>
+              <a:rPr lang="en-AU" baseline="0" dirty="0"/>
               <a:t> </a:t>
             </a:r>
             <a:r>
-              <a:rPr lang="en-AU" baseline="0" dirty="0" err="1" smtClean="0"/>
+              <a:rPr lang="en-AU" baseline="0" dirty="0" err="1"/>
               <a:t>Symantics</a:t>
             </a:r>
             <a:r>
-              <a:rPr lang="en-AU" baseline="0" dirty="0" smtClean="0"/>
+              <a:rPr lang="en-AU" baseline="0" dirty="0"/>
               <a:t> are a little hidden here, but if there was more than one task inside the catch block we would not be able to tell which of those things could cause an error.</a:t>
             </a:r>
           </a:p>
@@ -690,7 +706,7 @@
           <a:lstStyle/>
           <a:p>
             <a:r>
-              <a:rPr lang="en-AU" dirty="0" smtClean="0"/>
+              <a:rPr lang="en-AU" dirty="0"/>
               <a:t>Pros:</a:t>
             </a:r>
           </a:p>
@@ -699,7 +715,7 @@
               <a:buAutoNum type="arabicPeriod"/>
             </a:pPr>
             <a:r>
-              <a:rPr lang="en-AU" baseline="0" dirty="0" smtClean="0"/>
+              <a:rPr lang="en-AU" baseline="0" dirty="0"/>
               <a:t>The Signature of the method tells you what it is really doing – Easier to Maintain</a:t>
             </a:r>
           </a:p>
@@ -708,15 +724,15 @@
               <a:buAutoNum type="arabicPeriod"/>
             </a:pPr>
             <a:r>
-              <a:rPr lang="en-AU" baseline="0" dirty="0" smtClean="0"/>
+              <a:rPr lang="en-AU" baseline="0" dirty="0"/>
               <a:t>It lets you know if it worked or not and is therefore </a:t>
             </a:r>
             <a:r>
-              <a:rPr lang="en-AU" baseline="0" dirty="0" err="1" smtClean="0"/>
+              <a:rPr lang="en-AU" baseline="0" dirty="0" err="1"/>
               <a:t>composable</a:t>
             </a:r>
             <a:r>
-              <a:rPr lang="en-AU" baseline="0" dirty="0" smtClean="0"/>
+              <a:rPr lang="en-AU" baseline="0" dirty="0"/>
               <a:t> </a:t>
             </a:r>
             <a:endParaRPr lang="en-AU" dirty="0"/>
@@ -804,29 +820,29 @@
           <a:lstStyle/>
           <a:p>
             <a:r>
-              <a:rPr lang="en-AU" dirty="0" smtClean="0"/>
+              <a:rPr lang="en-AU" dirty="0"/>
               <a:t>This</a:t>
             </a:r>
             <a:r>
-              <a:rPr lang="en-AU" baseline="0" dirty="0" smtClean="0"/>
+              <a:rPr lang="en-AU" baseline="0" dirty="0"/>
               <a:t> is a place where we actually made more lines of code overall, but each of the parts makes more sense and gives greater control.</a:t>
             </a:r>
           </a:p>
           <a:p>
             <a:r>
-              <a:rPr lang="en-AU" baseline="0" dirty="0" err="1" smtClean="0"/>
+              <a:rPr lang="en-AU" baseline="0" dirty="0" err="1"/>
               <a:t>FileLoaded</a:t>
             </a:r>
             <a:r>
-              <a:rPr lang="en-AU" baseline="0" dirty="0" smtClean="0"/>
+              <a:rPr lang="en-AU" baseline="0" dirty="0"/>
               <a:t> is a </a:t>
             </a:r>
             <a:r>
-              <a:rPr lang="en-AU" baseline="0" dirty="0" err="1" smtClean="0"/>
+              <a:rPr lang="en-AU" baseline="0" dirty="0" err="1"/>
               <a:t>boolean</a:t>
             </a:r>
             <a:r>
-              <a:rPr lang="en-AU" baseline="0" dirty="0" smtClean="0"/>
+              <a:rPr lang="en-AU" baseline="0" dirty="0"/>
               <a:t> property which is still a little deceptive – And would be the next thing to re-factor, but we’ll leave it here.</a:t>
             </a:r>
             <a:endParaRPr lang="en-AU" dirty="0"/>
@@ -917,7 +933,7 @@
               <a:buNone/>
             </a:pPr>
             <a:r>
-              <a:rPr lang="en-AU" baseline="0" dirty="0" smtClean="0"/>
+              <a:rPr lang="en-AU" baseline="0" dirty="0"/>
               <a:t>The Exception happened where we describe the issue (Previous propagated up and you would be looking for the reason in the wrong place.</a:t>
             </a:r>
           </a:p>
@@ -925,22 +941,22 @@
             <a:pPr marL="0" indent="0">
               <a:buNone/>
             </a:pPr>
-            <a:endParaRPr lang="en-AU" baseline="0" dirty="0" smtClean="0"/>
+            <a:endParaRPr lang="en-AU" baseline="0" dirty="0"/>
           </a:p>
           <a:p>
             <a:pPr marL="0" indent="0">
               <a:buNone/>
             </a:pPr>
             <a:r>
-              <a:rPr lang="en-AU" baseline="0" dirty="0" smtClean="0"/>
+              <a:rPr lang="en-AU" baseline="0" dirty="0"/>
               <a:t>Make sure the Exception is truly exceptional.  Handle anything that is reasonable to expect.  Exceptional is something as a user you could expect to fix by just trying again (file locked, server down).  OR if you are a developer and you have done something wrong (</a:t>
             </a:r>
             <a:r>
-              <a:rPr lang="en-AU" baseline="0" dirty="0" err="1" smtClean="0"/>
+              <a:rPr lang="en-AU" baseline="0" dirty="0" err="1"/>
               <a:t>ie</a:t>
             </a:r>
             <a:r>
-              <a:rPr lang="en-AU" baseline="0" dirty="0" smtClean="0"/>
+              <a:rPr lang="en-AU" baseline="0" dirty="0"/>
               <a:t> misused the API or interface)</a:t>
             </a:r>
           </a:p>
@@ -1027,18 +1043,17 @@
           <a:lstStyle/>
           <a:p>
             <a:r>
-              <a:rPr lang="en-AU" dirty="0" smtClean="0"/>
+              <a:rPr lang="en-AU" dirty="0"/>
               <a:t>Not much change here</a:t>
             </a:r>
             <a:r>
-              <a:rPr lang="en-AU" baseline="0" dirty="0" smtClean="0"/>
+              <a:rPr lang="en-AU" baseline="0" dirty="0"/>
               <a:t> except that </a:t>
             </a:r>
             <a:r>
-              <a:rPr lang="en-AU" dirty="0" smtClean="0"/>
+              <a:rPr lang="en-AU" dirty="0"/>
               <a:t>The exception</a:t>
             </a:r>
-            <a:endParaRPr lang="en-AU" dirty="0"/>
           </a:p>
         </p:txBody>
       </p:sp>
@@ -1126,7 +1141,7 @@
               <a:buNone/>
             </a:pPr>
             <a:r>
-              <a:rPr lang="en-AU" baseline="0" dirty="0" smtClean="0"/>
+              <a:rPr lang="en-AU" baseline="0" dirty="0"/>
               <a:t>The rules relating to the validation of the Filename are conceptual - </a:t>
             </a:r>
           </a:p>
@@ -1206,7 +1221,7 @@
           <a:lstStyle/>
           <a:p>
             <a:r>
-              <a:rPr lang="en-US" smtClean="0"/>
+              <a:rPr lang="en-US"/>
               <a:t>Click to edit Master title style</a:t>
             </a:r>
             <a:endParaRPr lang="en-AU"/>
@@ -1325,7 +1340,7 @@
           </a:lstStyle>
           <a:p>
             <a:r>
-              <a:rPr lang="en-US" smtClean="0"/>
+              <a:rPr lang="en-US"/>
               <a:t>Click to edit Master subtitle style</a:t>
             </a:r>
             <a:endParaRPr lang="en-AU"/>
@@ -1349,7 +1364,7 @@
           <a:p>
             <a:fld id="{7D2782F2-479D-4E27-88CD-D15E75758C3E}" type="datetimeFigureOut">
               <a:rPr lang="en-AU" smtClean="0"/>
-              <a:t>22/04/2017</a:t>
+              <a:t>24/04/2017</a:t>
             </a:fld>
             <a:endParaRPr lang="en-AU"/>
           </a:p>
@@ -1443,7 +1458,7 @@
           <a:lstStyle/>
           <a:p>
             <a:r>
-              <a:rPr lang="en-US" smtClean="0"/>
+              <a:rPr lang="en-US"/>
               <a:t>Click to edit Master title style</a:t>
             </a:r>
             <a:endParaRPr lang="en-AU"/>
@@ -1467,35 +1482,35 @@
           <a:p>
             <a:pPr lvl="0"/>
             <a:r>
-              <a:rPr lang="en-US" smtClean="0"/>
+              <a:rPr lang="en-US"/>
               <a:t>Click to edit Master text styles</a:t>
             </a:r>
           </a:p>
           <a:p>
             <a:pPr lvl="1"/>
             <a:r>
-              <a:rPr lang="en-US" smtClean="0"/>
+              <a:rPr lang="en-US"/>
               <a:t>Second level</a:t>
             </a:r>
           </a:p>
           <a:p>
             <a:pPr lvl="2"/>
             <a:r>
-              <a:rPr lang="en-US" smtClean="0"/>
+              <a:rPr lang="en-US"/>
               <a:t>Third level</a:t>
             </a:r>
           </a:p>
           <a:p>
             <a:pPr lvl="3"/>
             <a:r>
-              <a:rPr lang="en-US" smtClean="0"/>
+              <a:rPr lang="en-US"/>
               <a:t>Fourth level</a:t>
             </a:r>
           </a:p>
           <a:p>
             <a:pPr lvl="4"/>
             <a:r>
-              <a:rPr lang="en-US" smtClean="0"/>
+              <a:rPr lang="en-US"/>
               <a:t>Fifth level</a:t>
             </a:r>
             <a:endParaRPr lang="en-AU"/>
@@ -1519,7 +1534,7 @@
           <a:p>
             <a:fld id="{7D2782F2-479D-4E27-88CD-D15E75758C3E}" type="datetimeFigureOut">
               <a:rPr lang="en-AU" smtClean="0"/>
-              <a:t>22/04/2017</a:t>
+              <a:t>24/04/2017</a:t>
             </a:fld>
             <a:endParaRPr lang="en-AU"/>
           </a:p>
@@ -1618,7 +1633,7 @@
           <a:lstStyle/>
           <a:p>
             <a:r>
-              <a:rPr lang="en-US" smtClean="0"/>
+              <a:rPr lang="en-US"/>
               <a:t>Click to edit Master title style</a:t>
             </a:r>
             <a:endParaRPr lang="en-AU"/>
@@ -1647,35 +1662,35 @@
           <a:p>
             <a:pPr lvl="0"/>
             <a:r>
-              <a:rPr lang="en-US" smtClean="0"/>
+              <a:rPr lang="en-US"/>
               <a:t>Click to edit Master text styles</a:t>
             </a:r>
           </a:p>
           <a:p>
             <a:pPr lvl="1"/>
             <a:r>
-              <a:rPr lang="en-US" smtClean="0"/>
+              <a:rPr lang="en-US"/>
               <a:t>Second level</a:t>
             </a:r>
           </a:p>
           <a:p>
             <a:pPr lvl="2"/>
             <a:r>
-              <a:rPr lang="en-US" smtClean="0"/>
+              <a:rPr lang="en-US"/>
               <a:t>Third level</a:t>
             </a:r>
           </a:p>
           <a:p>
             <a:pPr lvl="3"/>
             <a:r>
-              <a:rPr lang="en-US" smtClean="0"/>
+              <a:rPr lang="en-US"/>
               <a:t>Fourth level</a:t>
             </a:r>
           </a:p>
           <a:p>
             <a:pPr lvl="4"/>
             <a:r>
-              <a:rPr lang="en-US" smtClean="0"/>
+              <a:rPr lang="en-US"/>
               <a:t>Fifth level</a:t>
             </a:r>
             <a:endParaRPr lang="en-AU"/>
@@ -1699,7 +1714,7 @@
           <a:p>
             <a:fld id="{7D2782F2-479D-4E27-88CD-D15E75758C3E}" type="datetimeFigureOut">
               <a:rPr lang="en-AU" smtClean="0"/>
-              <a:t>22/04/2017</a:t>
+              <a:t>24/04/2017</a:t>
             </a:fld>
             <a:endParaRPr lang="en-AU"/>
           </a:p>
@@ -1793,7 +1808,7 @@
           <a:lstStyle/>
           <a:p>
             <a:r>
-              <a:rPr lang="en-US" smtClean="0"/>
+              <a:rPr lang="en-US"/>
               <a:t>Click to edit Master title style</a:t>
             </a:r>
             <a:endParaRPr lang="en-AU"/>
@@ -1817,35 +1832,35 @@
           <a:p>
             <a:pPr lvl="0"/>
             <a:r>
-              <a:rPr lang="en-US" smtClean="0"/>
+              <a:rPr lang="en-US"/>
               <a:t>Click to edit Master text styles</a:t>
             </a:r>
           </a:p>
           <a:p>
             <a:pPr lvl="1"/>
             <a:r>
-              <a:rPr lang="en-US" smtClean="0"/>
+              <a:rPr lang="en-US"/>
               <a:t>Second level</a:t>
             </a:r>
           </a:p>
           <a:p>
             <a:pPr lvl="2"/>
             <a:r>
-              <a:rPr lang="en-US" smtClean="0"/>
+              <a:rPr lang="en-US"/>
               <a:t>Third level</a:t>
             </a:r>
           </a:p>
           <a:p>
             <a:pPr lvl="3"/>
             <a:r>
-              <a:rPr lang="en-US" smtClean="0"/>
+              <a:rPr lang="en-US"/>
               <a:t>Fourth level</a:t>
             </a:r>
           </a:p>
           <a:p>
             <a:pPr lvl="4"/>
             <a:r>
-              <a:rPr lang="en-US" smtClean="0"/>
+              <a:rPr lang="en-US"/>
               <a:t>Fifth level</a:t>
             </a:r>
             <a:endParaRPr lang="en-AU"/>
@@ -1869,7 +1884,7 @@
           <a:p>
             <a:fld id="{7D2782F2-479D-4E27-88CD-D15E75758C3E}" type="datetimeFigureOut">
               <a:rPr lang="en-AU" smtClean="0"/>
-              <a:t>22/04/2017</a:t>
+              <a:t>24/04/2017</a:t>
             </a:fld>
             <a:endParaRPr lang="en-AU"/>
           </a:p>
@@ -1972,7 +1987,7 @@
           </a:lstStyle>
           <a:p>
             <a:r>
-              <a:rPr lang="en-US" smtClean="0"/>
+              <a:rPr lang="en-US"/>
               <a:t>Click to edit Master title style</a:t>
             </a:r>
             <a:endParaRPr lang="en-AU"/>
@@ -2092,7 +2107,7 @@
           <a:p>
             <a:pPr lvl="0"/>
             <a:r>
-              <a:rPr lang="en-US" smtClean="0"/>
+              <a:rPr lang="en-US"/>
               <a:t>Click to edit Master text styles</a:t>
             </a:r>
           </a:p>
@@ -2115,7 +2130,7 @@
           <a:p>
             <a:fld id="{7D2782F2-479D-4E27-88CD-D15E75758C3E}" type="datetimeFigureOut">
               <a:rPr lang="en-AU" smtClean="0"/>
-              <a:t>22/04/2017</a:t>
+              <a:t>24/04/2017</a:t>
             </a:fld>
             <a:endParaRPr lang="en-AU"/>
           </a:p>
@@ -2209,7 +2224,7 @@
           <a:lstStyle/>
           <a:p>
             <a:r>
-              <a:rPr lang="en-US" smtClean="0"/>
+              <a:rPr lang="en-US"/>
               <a:t>Click to edit Master title style</a:t>
             </a:r>
             <a:endParaRPr lang="en-AU"/>
@@ -2266,35 +2281,35 @@
           <a:p>
             <a:pPr lvl="0"/>
             <a:r>
-              <a:rPr lang="en-US" smtClean="0"/>
+              <a:rPr lang="en-US"/>
               <a:t>Click to edit Master text styles</a:t>
             </a:r>
           </a:p>
           <a:p>
             <a:pPr lvl="1"/>
             <a:r>
-              <a:rPr lang="en-US" smtClean="0"/>
+              <a:rPr lang="en-US"/>
               <a:t>Second level</a:t>
             </a:r>
           </a:p>
           <a:p>
             <a:pPr lvl="2"/>
             <a:r>
-              <a:rPr lang="en-US" smtClean="0"/>
+              <a:rPr lang="en-US"/>
               <a:t>Third level</a:t>
             </a:r>
           </a:p>
           <a:p>
             <a:pPr lvl="3"/>
             <a:r>
-              <a:rPr lang="en-US" smtClean="0"/>
+              <a:rPr lang="en-US"/>
               <a:t>Fourth level</a:t>
             </a:r>
           </a:p>
           <a:p>
             <a:pPr lvl="4"/>
             <a:r>
-              <a:rPr lang="en-US" smtClean="0"/>
+              <a:rPr lang="en-US"/>
               <a:t>Fifth level</a:t>
             </a:r>
             <a:endParaRPr lang="en-AU"/>
@@ -2351,35 +2366,35 @@
           <a:p>
             <a:pPr lvl="0"/>
             <a:r>
-              <a:rPr lang="en-US" smtClean="0"/>
+              <a:rPr lang="en-US"/>
               <a:t>Click to edit Master text styles</a:t>
             </a:r>
           </a:p>
           <a:p>
             <a:pPr lvl="1"/>
             <a:r>
-              <a:rPr lang="en-US" smtClean="0"/>
+              <a:rPr lang="en-US"/>
               <a:t>Second level</a:t>
             </a:r>
           </a:p>
           <a:p>
             <a:pPr lvl="2"/>
             <a:r>
-              <a:rPr lang="en-US" smtClean="0"/>
+              <a:rPr lang="en-US"/>
               <a:t>Third level</a:t>
             </a:r>
           </a:p>
           <a:p>
             <a:pPr lvl="3"/>
             <a:r>
-              <a:rPr lang="en-US" smtClean="0"/>
+              <a:rPr lang="en-US"/>
               <a:t>Fourth level</a:t>
             </a:r>
           </a:p>
           <a:p>
             <a:pPr lvl="4"/>
             <a:r>
-              <a:rPr lang="en-US" smtClean="0"/>
+              <a:rPr lang="en-US"/>
               <a:t>Fifth level</a:t>
             </a:r>
             <a:endParaRPr lang="en-AU"/>
@@ -2403,7 +2418,7 @@
           <a:p>
             <a:fld id="{7D2782F2-479D-4E27-88CD-D15E75758C3E}" type="datetimeFigureOut">
               <a:rPr lang="en-AU" smtClean="0"/>
-              <a:t>22/04/2017</a:t>
+              <a:t>24/04/2017</a:t>
             </a:fld>
             <a:endParaRPr lang="en-AU"/>
           </a:p>
@@ -2501,7 +2516,7 @@
           </a:lstStyle>
           <a:p>
             <a:r>
-              <a:rPr lang="en-US" smtClean="0"/>
+              <a:rPr lang="en-US"/>
               <a:t>Click to edit Master title style</a:t>
             </a:r>
             <a:endParaRPr lang="en-AU"/>
@@ -2567,7 +2582,7 @@
           <a:p>
             <a:pPr lvl="0"/>
             <a:r>
-              <a:rPr lang="en-US" smtClean="0"/>
+              <a:rPr lang="en-US"/>
               <a:t>Click to edit Master text styles</a:t>
             </a:r>
           </a:p>
@@ -2623,35 +2638,35 @@
           <a:p>
             <a:pPr lvl="0"/>
             <a:r>
-              <a:rPr lang="en-US" smtClean="0"/>
+              <a:rPr lang="en-US"/>
               <a:t>Click to edit Master text styles</a:t>
             </a:r>
           </a:p>
           <a:p>
             <a:pPr lvl="1"/>
             <a:r>
-              <a:rPr lang="en-US" smtClean="0"/>
+              <a:rPr lang="en-US"/>
               <a:t>Second level</a:t>
             </a:r>
           </a:p>
           <a:p>
             <a:pPr lvl="2"/>
             <a:r>
-              <a:rPr lang="en-US" smtClean="0"/>
+              <a:rPr lang="en-US"/>
               <a:t>Third level</a:t>
             </a:r>
           </a:p>
           <a:p>
             <a:pPr lvl="3"/>
             <a:r>
-              <a:rPr lang="en-US" smtClean="0"/>
+              <a:rPr lang="en-US"/>
               <a:t>Fourth level</a:t>
             </a:r>
           </a:p>
           <a:p>
             <a:pPr lvl="4"/>
             <a:r>
-              <a:rPr lang="en-US" smtClean="0"/>
+              <a:rPr lang="en-US"/>
               <a:t>Fifth level</a:t>
             </a:r>
             <a:endParaRPr lang="en-AU"/>
@@ -2717,7 +2732,7 @@
           <a:p>
             <a:pPr lvl="0"/>
             <a:r>
-              <a:rPr lang="en-US" smtClean="0"/>
+              <a:rPr lang="en-US"/>
               <a:t>Click to edit Master text styles</a:t>
             </a:r>
           </a:p>
@@ -2773,35 +2788,35 @@
           <a:p>
             <a:pPr lvl="0"/>
             <a:r>
-              <a:rPr lang="en-US" smtClean="0"/>
+              <a:rPr lang="en-US"/>
               <a:t>Click to edit Master text styles</a:t>
             </a:r>
           </a:p>
           <a:p>
             <a:pPr lvl="1"/>
             <a:r>
-              <a:rPr lang="en-US" smtClean="0"/>
+              <a:rPr lang="en-US"/>
               <a:t>Second level</a:t>
             </a:r>
           </a:p>
           <a:p>
             <a:pPr lvl="2"/>
             <a:r>
-              <a:rPr lang="en-US" smtClean="0"/>
+              <a:rPr lang="en-US"/>
               <a:t>Third level</a:t>
             </a:r>
           </a:p>
           <a:p>
             <a:pPr lvl="3"/>
             <a:r>
-              <a:rPr lang="en-US" smtClean="0"/>
+              <a:rPr lang="en-US"/>
               <a:t>Fourth level</a:t>
             </a:r>
           </a:p>
           <a:p>
             <a:pPr lvl="4"/>
             <a:r>
-              <a:rPr lang="en-US" smtClean="0"/>
+              <a:rPr lang="en-US"/>
               <a:t>Fifth level</a:t>
             </a:r>
             <a:endParaRPr lang="en-AU"/>
@@ -2825,7 +2840,7 @@
           <a:p>
             <a:fld id="{7D2782F2-479D-4E27-88CD-D15E75758C3E}" type="datetimeFigureOut">
               <a:rPr lang="en-AU" smtClean="0"/>
-              <a:t>22/04/2017</a:t>
+              <a:t>24/04/2017</a:t>
             </a:fld>
             <a:endParaRPr lang="en-AU"/>
           </a:p>
@@ -2919,7 +2934,7 @@
           <a:lstStyle/>
           <a:p>
             <a:r>
-              <a:rPr lang="en-US" smtClean="0"/>
+              <a:rPr lang="en-US"/>
               <a:t>Click to edit Master title style</a:t>
             </a:r>
             <a:endParaRPr lang="en-AU"/>
@@ -2943,7 +2958,7 @@
           <a:p>
             <a:fld id="{7D2782F2-479D-4E27-88CD-D15E75758C3E}" type="datetimeFigureOut">
               <a:rPr lang="en-AU" smtClean="0"/>
-              <a:t>22/04/2017</a:t>
+              <a:t>24/04/2017</a:t>
             </a:fld>
             <a:endParaRPr lang="en-AU"/>
           </a:p>
@@ -3038,7 +3053,7 @@
           <a:p>
             <a:fld id="{7D2782F2-479D-4E27-88CD-D15E75758C3E}" type="datetimeFigureOut">
               <a:rPr lang="en-AU" smtClean="0"/>
-              <a:t>22/04/2017</a:t>
+              <a:t>24/04/2017</a:t>
             </a:fld>
             <a:endParaRPr lang="en-AU"/>
           </a:p>
@@ -3141,7 +3156,7 @@
           </a:lstStyle>
           <a:p>
             <a:r>
-              <a:rPr lang="en-US" smtClean="0"/>
+              <a:rPr lang="en-US"/>
               <a:t>Click to edit Master title style</a:t>
             </a:r>
             <a:endParaRPr lang="en-AU"/>
@@ -3198,35 +3213,35 @@
           <a:p>
             <a:pPr lvl="0"/>
             <a:r>
-              <a:rPr lang="en-US" smtClean="0"/>
+              <a:rPr lang="en-US"/>
               <a:t>Click to edit Master text styles</a:t>
             </a:r>
           </a:p>
           <a:p>
             <a:pPr lvl="1"/>
             <a:r>
-              <a:rPr lang="en-US" smtClean="0"/>
+              <a:rPr lang="en-US"/>
               <a:t>Second level</a:t>
             </a:r>
           </a:p>
           <a:p>
             <a:pPr lvl="2"/>
             <a:r>
-              <a:rPr lang="en-US" smtClean="0"/>
+              <a:rPr lang="en-US"/>
               <a:t>Third level</a:t>
             </a:r>
           </a:p>
           <a:p>
             <a:pPr lvl="3"/>
             <a:r>
-              <a:rPr lang="en-US" smtClean="0"/>
+              <a:rPr lang="en-US"/>
               <a:t>Fourth level</a:t>
             </a:r>
           </a:p>
           <a:p>
             <a:pPr lvl="4"/>
             <a:r>
-              <a:rPr lang="en-US" smtClean="0"/>
+              <a:rPr lang="en-US"/>
               <a:t>Fifth level</a:t>
             </a:r>
             <a:endParaRPr lang="en-AU"/>
@@ -3292,7 +3307,7 @@
           <a:p>
             <a:pPr lvl="0"/>
             <a:r>
-              <a:rPr lang="en-US" smtClean="0"/>
+              <a:rPr lang="en-US"/>
               <a:t>Click to edit Master text styles</a:t>
             </a:r>
           </a:p>
@@ -3315,7 +3330,7 @@
           <a:p>
             <a:fld id="{7D2782F2-479D-4E27-88CD-D15E75758C3E}" type="datetimeFigureOut">
               <a:rPr lang="en-AU" smtClean="0"/>
-              <a:t>22/04/2017</a:t>
+              <a:t>24/04/2017</a:t>
             </a:fld>
             <a:endParaRPr lang="en-AU"/>
           </a:p>
@@ -3418,7 +3433,7 @@
           </a:lstStyle>
           <a:p>
             <a:r>
-              <a:rPr lang="en-US" smtClean="0"/>
+              <a:rPr lang="en-US"/>
               <a:t>Click to edit Master title style</a:t>
             </a:r>
             <a:endParaRPr lang="en-AU"/>
@@ -3545,7 +3560,7 @@
           <a:p>
             <a:pPr lvl="0"/>
             <a:r>
-              <a:rPr lang="en-US" smtClean="0"/>
+              <a:rPr lang="en-US"/>
               <a:t>Click to edit Master text styles</a:t>
             </a:r>
           </a:p>
@@ -3568,7 +3583,7 @@
           <a:p>
             <a:fld id="{7D2782F2-479D-4E27-88CD-D15E75758C3E}" type="datetimeFigureOut">
               <a:rPr lang="en-AU" smtClean="0"/>
-              <a:t>22/04/2017</a:t>
+              <a:t>24/04/2017</a:t>
             </a:fld>
             <a:endParaRPr lang="en-AU"/>
           </a:p>
@@ -3687,7 +3702,7 @@
           <a:lstStyle/>
           <a:p>
             <a:r>
-              <a:rPr lang="en-US" smtClean="0"/>
+              <a:rPr lang="en-US"/>
               <a:t>Click to edit Master title style</a:t>
             </a:r>
             <a:endParaRPr lang="en-AU"/>
@@ -3721,35 +3736,35 @@
           <a:p>
             <a:pPr lvl="0"/>
             <a:r>
-              <a:rPr lang="en-US" smtClean="0"/>
+              <a:rPr lang="en-US"/>
               <a:t>Click to edit Master text styles</a:t>
             </a:r>
           </a:p>
           <a:p>
             <a:pPr lvl="1"/>
             <a:r>
-              <a:rPr lang="en-US" smtClean="0"/>
+              <a:rPr lang="en-US"/>
               <a:t>Second level</a:t>
             </a:r>
           </a:p>
           <a:p>
             <a:pPr lvl="2"/>
             <a:r>
-              <a:rPr lang="en-US" smtClean="0"/>
+              <a:rPr lang="en-US"/>
               <a:t>Third level</a:t>
             </a:r>
           </a:p>
           <a:p>
             <a:pPr lvl="3"/>
             <a:r>
-              <a:rPr lang="en-US" smtClean="0"/>
+              <a:rPr lang="en-US"/>
               <a:t>Fourth level</a:t>
             </a:r>
           </a:p>
           <a:p>
             <a:pPr lvl="4"/>
             <a:r>
-              <a:rPr lang="en-US" smtClean="0"/>
+              <a:rPr lang="en-US"/>
               <a:t>Fifth level</a:t>
             </a:r>
             <a:endParaRPr lang="en-AU"/>
@@ -3791,7 +3806,7 @@
           <a:p>
             <a:fld id="{7D2782F2-479D-4E27-88CD-D15E75758C3E}" type="datetimeFigureOut">
               <a:rPr lang="en-AU" smtClean="0"/>
-              <a:t>22/04/2017</a:t>
+              <a:t>24/04/2017</a:t>
             </a:fld>
             <a:endParaRPr lang="en-AU"/>
           </a:p>
@@ -4188,10 +4203,9 @@
           <a:lstStyle/>
           <a:p>
             <a:r>
-              <a:rPr lang="en-AU" dirty="0" smtClean="0"/>
+              <a:rPr lang="en-AU" dirty="0"/>
               <a:t>Functional Programming</a:t>
             </a:r>
-            <a:endParaRPr lang="en-AU" dirty="0"/>
           </a:p>
         </p:txBody>
       </p:sp>
@@ -4221,18 +4235,13 @@
           <a:lstStyle/>
           <a:p>
             <a:r>
-              <a:rPr lang="en-AU" dirty="0" smtClean="0">
+              <a:rPr lang="en-AU" dirty="0">
                 <a:solidFill>
                   <a:srgbClr val="002060"/>
                 </a:solidFill>
               </a:rPr>
               <a:t>Adopting functional programming principles in Delphi</a:t>
             </a:r>
-            <a:endParaRPr lang="en-AU" dirty="0">
-              <a:solidFill>
-                <a:srgbClr val="002060"/>
-              </a:solidFill>
-            </a:endParaRPr>
           </a:p>
         </p:txBody>
       </p:sp>
@@ -4246,13 +4255,6 @@
   <p:clrMapOvr>
     <a:masterClrMapping/>
   </p:clrMapOvr>
-  <p:timing>
-    <p:tnLst>
-      <p:par>
-        <p:cTn id="1" dur="indefinite" restart="never" nodeType="tmRoot"/>
-      </p:par>
-    </p:tnLst>
-  </p:timing>
 </p:sld>
 </file>
 
@@ -4297,10 +4299,9 @@
           <a:lstStyle/>
           <a:p>
             <a:r>
-              <a:rPr lang="en-AU" dirty="0" smtClean="0"/>
+              <a:rPr lang="en-AU" dirty="0"/>
               <a:t>Immutability helps reduce complexity related to maintaining state</a:t>
             </a:r>
-            <a:endParaRPr lang="en-AU" dirty="0"/>
           </a:p>
         </p:txBody>
       </p:sp>
@@ -5195,10 +5196,9 @@
           <a:lstStyle/>
           <a:p>
             <a:r>
-              <a:rPr lang="en-AU" sz="3200" dirty="0" smtClean="0"/>
+              <a:rPr lang="en-AU" sz="3200" dirty="0"/>
               <a:t>Reduce complexity, use composition and avoid using exceptions to control program flow.</a:t>
             </a:r>
-            <a:endParaRPr lang="en-AU" sz="3200" dirty="0"/>
           </a:p>
         </p:txBody>
       </p:sp>
@@ -5394,16 +5394,12 @@
           <a:lstStyle/>
           <a:p>
             <a:r>
-              <a:rPr lang="en-AU" dirty="0" smtClean="0">
+              <a:rPr lang="en-AU" dirty="0">
                 <a:latin typeface="Courier New" panose="02070309020205020404" pitchFamily="49" charset="0"/>
                 <a:cs typeface="Courier New" panose="02070309020205020404" pitchFamily="49" charset="0"/>
               </a:rPr>
               <a:t>Result := ‘’;</a:t>
             </a:r>
-            <a:endParaRPr lang="en-AU" dirty="0">
-              <a:latin typeface="Courier New" panose="02070309020205020404" pitchFamily="49" charset="0"/>
-              <a:cs typeface="Courier New" panose="02070309020205020404" pitchFamily="49" charset="0"/>
-            </a:endParaRPr>
           </a:p>
         </p:txBody>
       </p:sp>
@@ -5563,7 +5559,7 @@
           <a:lstStyle/>
           <a:p>
             <a:r>
-              <a:rPr lang="en-AU" sz="2800" dirty="0" smtClean="0">
+              <a:rPr lang="en-AU" sz="2800" dirty="0">
                 <a:solidFill>
                   <a:srgbClr val="00B050"/>
                 </a:solidFill>
@@ -5578,19 +5574,6 @@
               </a:rPr>
               <a:t>Composition</a:t>
             </a:r>
-            <a:endParaRPr lang="en-AU" sz="2800" dirty="0">
-              <a:solidFill>
-                <a:srgbClr val="00B050"/>
-              </a:solidFill>
-              <a:effectLst>
-                <a:outerShdw blurRad="38100" dist="38100" dir="2700000" algn="tl">
-                  <a:srgbClr val="000000">
-                    <a:alpha val="43137"/>
-                  </a:srgbClr>
-                </a:outerShdw>
-              </a:effectLst>
-              <a:latin typeface="Comic Sans MS" panose="030F0702030302020204" pitchFamily="66" charset="0"/>
-            </a:endParaRPr>
           </a:p>
         </p:txBody>
       </p:sp>
@@ -6066,7 +6049,7 @@
           <a:lstStyle/>
           <a:p>
             <a:r>
-              <a:rPr lang="en-AU" sz="2800" dirty="0" smtClean="0">
+              <a:rPr lang="en-AU" sz="2800" dirty="0">
                 <a:solidFill>
                   <a:srgbClr val="FF0000"/>
                 </a:solidFill>
@@ -6081,19 +6064,6 @@
               </a:rPr>
               <a:t>Exception</a:t>
             </a:r>
-            <a:endParaRPr lang="en-AU" sz="2800" dirty="0">
-              <a:solidFill>
-                <a:srgbClr val="FF0000"/>
-              </a:solidFill>
-              <a:effectLst>
-                <a:outerShdw blurRad="38100" dist="38100" dir="2700000" algn="tl">
-                  <a:srgbClr val="000000">
-                    <a:alpha val="43137"/>
-                  </a:srgbClr>
-                </a:outerShdw>
-              </a:effectLst>
-              <a:latin typeface="Comic Sans MS" panose="030F0702030302020204" pitchFamily="66" charset="0"/>
-            </a:endParaRPr>
           </a:p>
         </p:txBody>
       </p:sp>
@@ -6120,7 +6090,7 @@
           <a:lstStyle/>
           <a:p>
             <a:r>
-              <a:rPr lang="en-AU" sz="2800" dirty="0" smtClean="0">
+              <a:rPr lang="en-AU" sz="2800" dirty="0">
                 <a:solidFill>
                   <a:srgbClr val="FF0000"/>
                 </a:solidFill>
@@ -6135,19 +6105,6 @@
               </a:rPr>
               <a:t>GOTO Semantics</a:t>
             </a:r>
-            <a:endParaRPr lang="en-AU" sz="2800" dirty="0">
-              <a:solidFill>
-                <a:srgbClr val="FF0000"/>
-              </a:solidFill>
-              <a:effectLst>
-                <a:outerShdw blurRad="38100" dist="38100" dir="2700000" algn="tl">
-                  <a:srgbClr val="000000">
-                    <a:alpha val="43137"/>
-                  </a:srgbClr>
-                </a:outerShdw>
-              </a:effectLst>
-              <a:latin typeface="Comic Sans MS" panose="030F0702030302020204" pitchFamily="66" charset="0"/>
-            </a:endParaRPr>
           </a:p>
         </p:txBody>
       </p:sp>
@@ -7303,10 +7260,9 @@
           <a:lstStyle/>
           <a:p>
             <a:r>
-              <a:rPr lang="en-AU" dirty="0" smtClean="0"/>
+              <a:rPr lang="en-AU" dirty="0"/>
               <a:t>Describing more honestly what is done helps identify and reduce side effects. </a:t>
             </a:r>
-            <a:endParaRPr lang="en-AU" dirty="0"/>
           </a:p>
         </p:txBody>
       </p:sp>
@@ -7541,7 +7497,7 @@
           <a:lstStyle/>
           <a:p>
             <a:r>
-              <a:rPr lang="en-AU" sz="2800" dirty="0" smtClean="0">
+              <a:rPr lang="en-AU" sz="2800" dirty="0">
                 <a:solidFill>
                   <a:srgbClr val="00B050"/>
                 </a:solidFill>
@@ -7556,19 +7512,6 @@
               </a:rPr>
               <a:t>Composition</a:t>
             </a:r>
-            <a:endParaRPr lang="en-AU" sz="2800" dirty="0">
-              <a:solidFill>
-                <a:srgbClr val="00B050"/>
-              </a:solidFill>
-              <a:effectLst>
-                <a:outerShdw blurRad="38100" dist="38100" dir="2700000" algn="tl">
-                  <a:srgbClr val="000000">
-                    <a:alpha val="43137"/>
-                  </a:srgbClr>
-                </a:outerShdw>
-              </a:effectLst>
-              <a:latin typeface="Comic Sans MS" panose="030F0702030302020204" pitchFamily="66" charset="0"/>
-            </a:endParaRPr>
           </a:p>
         </p:txBody>
       </p:sp>
@@ -7742,7 +7685,7 @@
           <a:lstStyle/>
           <a:p>
             <a:r>
-              <a:rPr lang="en-AU" sz="2800" dirty="0" smtClean="0">
+              <a:rPr lang="en-AU" sz="2800" dirty="0">
                 <a:solidFill>
                   <a:srgbClr val="00B050"/>
                 </a:solidFill>
@@ -7757,19 +7700,6 @@
               </a:rPr>
               <a:t>In-line (pure) function</a:t>
             </a:r>
-            <a:endParaRPr lang="en-AU" sz="2800" dirty="0">
-              <a:solidFill>
-                <a:srgbClr val="00B050"/>
-              </a:solidFill>
-              <a:effectLst>
-                <a:outerShdw blurRad="38100" dist="38100" dir="2700000" algn="tl">
-                  <a:srgbClr val="000000">
-                    <a:alpha val="43137"/>
-                  </a:srgbClr>
-                </a:outerShdw>
-              </a:effectLst>
-              <a:latin typeface="Comic Sans MS" panose="030F0702030302020204" pitchFamily="66" charset="0"/>
-            </a:endParaRPr>
           </a:p>
         </p:txBody>
       </p:sp>
@@ -7897,7 +7827,7 @@
           <a:lstStyle/>
           <a:p>
             <a:r>
-              <a:rPr lang="en-AU" sz="2800" dirty="0" smtClean="0">
+              <a:rPr lang="en-AU" sz="2800" dirty="0">
                 <a:solidFill>
                   <a:srgbClr val="00B050"/>
                 </a:solidFill>
@@ -7912,19 +7842,6 @@
               </a:rPr>
               <a:t>Higher Order Function</a:t>
             </a:r>
-            <a:endParaRPr lang="en-AU" sz="2800" dirty="0">
-              <a:solidFill>
-                <a:srgbClr val="00B050"/>
-              </a:solidFill>
-              <a:effectLst>
-                <a:outerShdw blurRad="38100" dist="38100" dir="2700000" algn="tl">
-                  <a:srgbClr val="000000">
-                    <a:alpha val="43137"/>
-                  </a:srgbClr>
-                </a:outerShdw>
-              </a:effectLst>
-              <a:latin typeface="Comic Sans MS" panose="030F0702030302020204" pitchFamily="66" charset="0"/>
-            </a:endParaRPr>
           </a:p>
         </p:txBody>
       </p:sp>
@@ -8210,7 +8127,7 @@
           <a:p>
             <a:pPr algn="ctr"/>
             <a:r>
-              <a:rPr lang="en-AU" sz="1300" dirty="0" err="1" smtClean="0">
+              <a:rPr lang="en-AU" sz="1300" dirty="0" err="1">
                 <a:solidFill>
                   <a:schemeClr val="tx1"/>
                 </a:solidFill>
@@ -8272,7 +8189,7 @@
           <a:p>
             <a:pPr algn="ctr"/>
             <a:r>
-              <a:rPr lang="en-AU" sz="1200" dirty="0" err="1" smtClean="0">
+              <a:rPr lang="en-AU" sz="1200" dirty="0" err="1">
                 <a:solidFill>
                   <a:schemeClr val="tx1"/>
                 </a:solidFill>
@@ -9326,10 +9243,9 @@
           <a:lstStyle/>
           <a:p>
             <a:r>
-              <a:rPr lang="en-AU" sz="4000" dirty="0" smtClean="0"/>
+              <a:rPr lang="en-AU" sz="4000" dirty="0"/>
               <a:t>Loading the file is now a separate step.</a:t>
             </a:r>
-            <a:endParaRPr lang="en-AU" sz="4000" dirty="0"/>
           </a:p>
         </p:txBody>
       </p:sp>
@@ -10346,10 +10262,9 @@
           <a:lstStyle/>
           <a:p>
             <a:r>
-              <a:rPr lang="en-AU" sz="4000" dirty="0" smtClean="0"/>
+              <a:rPr lang="en-AU" sz="4000" dirty="0"/>
               <a:t>Handle exceptions at the lowest level.</a:t>
             </a:r>
-            <a:endParaRPr lang="en-AU" sz="4000" dirty="0"/>
           </a:p>
         </p:txBody>
       </p:sp>
@@ -10437,7 +10352,7 @@
           <a:lstStyle/>
           <a:p>
             <a:r>
-              <a:rPr lang="en-AU" sz="2800" dirty="0" smtClean="0">
+              <a:rPr lang="en-AU" sz="2800" dirty="0">
                 <a:solidFill>
                   <a:schemeClr val="accent2">
                     <a:lumMod val="75000"/>
@@ -10454,21 +10369,6 @@
               </a:rPr>
               <a:t>Exception</a:t>
             </a:r>
-            <a:endParaRPr lang="en-AU" sz="2800" dirty="0">
-              <a:solidFill>
-                <a:schemeClr val="accent2">
-                  <a:lumMod val="75000"/>
-                </a:schemeClr>
-              </a:solidFill>
-              <a:effectLst>
-                <a:outerShdw blurRad="38100" dist="38100" dir="2700000" algn="tl">
-                  <a:srgbClr val="000000">
-                    <a:alpha val="43137"/>
-                  </a:srgbClr>
-                </a:outerShdw>
-              </a:effectLst>
-              <a:latin typeface="Comic Sans MS" panose="030F0702030302020204" pitchFamily="66" charset="0"/>
-            </a:endParaRPr>
           </a:p>
         </p:txBody>
       </p:sp>
@@ -10854,10 +10754,9 @@
           <a:lstStyle/>
           <a:p>
             <a:r>
-              <a:rPr lang="en-AU" sz="3200" dirty="0" smtClean="0"/>
+              <a:rPr lang="en-AU" sz="3200" dirty="0"/>
               <a:t>Fail fast, and exceptions are truly exceptional</a:t>
             </a:r>
-            <a:endParaRPr lang="en-AU" sz="3200" dirty="0"/>
           </a:p>
         </p:txBody>
       </p:sp>
@@ -11089,7 +10988,7 @@
           <a:lstStyle/>
           <a:p>
             <a:r>
-              <a:rPr lang="en-AU" sz="2800" dirty="0" smtClean="0">
+              <a:rPr lang="en-AU" sz="2800" dirty="0">
                 <a:solidFill>
                   <a:srgbClr val="FF0000"/>
                 </a:solidFill>
@@ -11104,19 +11003,6 @@
               </a:rPr>
               <a:t>Fail Fast- as soon as the problem is detectable   </a:t>
             </a:r>
-            <a:endParaRPr lang="en-AU" sz="2800" dirty="0">
-              <a:solidFill>
-                <a:srgbClr val="FF0000"/>
-              </a:solidFill>
-              <a:effectLst>
-                <a:outerShdw blurRad="38100" dist="38100" dir="2700000" algn="tl">
-                  <a:srgbClr val="000000">
-                    <a:alpha val="43137"/>
-                  </a:srgbClr>
-                </a:outerShdw>
-              </a:effectLst>
-              <a:latin typeface="Comic Sans MS" panose="030F0702030302020204" pitchFamily="66" charset="0"/>
-            </a:endParaRPr>
           </a:p>
         </p:txBody>
       </p:sp>
@@ -11302,7 +11188,7 @@
           <a:lstStyle/>
           <a:p>
             <a:r>
-              <a:rPr lang="en-AU" sz="2800" dirty="0" smtClean="0">
+              <a:rPr lang="en-AU" sz="2800" dirty="0">
                 <a:solidFill>
                   <a:srgbClr val="00B050"/>
                 </a:solidFill>
@@ -11317,19 +11203,6 @@
               </a:rPr>
               <a:t>Developer has done exceptional if we’re here </a:t>
             </a:r>
-            <a:endParaRPr lang="en-AU" sz="2800" dirty="0">
-              <a:solidFill>
-                <a:srgbClr val="00B050"/>
-              </a:solidFill>
-              <a:effectLst>
-                <a:outerShdw blurRad="38100" dist="38100" dir="2700000" algn="tl">
-                  <a:srgbClr val="000000">
-                    <a:alpha val="43137"/>
-                  </a:srgbClr>
-                </a:outerShdw>
-              </a:effectLst>
-              <a:latin typeface="Comic Sans MS" panose="030F0702030302020204" pitchFamily="66" charset="0"/>
-            </a:endParaRPr>
           </a:p>
         </p:txBody>
       </p:sp>
@@ -12024,10 +11897,9 @@
           <a:lstStyle/>
           <a:p>
             <a:r>
-              <a:rPr lang="en-AU" sz="2800" dirty="0" smtClean="0"/>
+              <a:rPr lang="en-AU" sz="2800" dirty="0"/>
               <a:t>Overcome Primitive Obsession: Accept only the data that you know is correct by creating Value Objects</a:t>
             </a:r>
-            <a:endParaRPr lang="en-AU" sz="2800" dirty="0"/>
           </a:p>
         </p:txBody>
       </p:sp>
@@ -12493,10 +12365,9 @@
           <a:lstStyle/>
           <a:p>
             <a:r>
-              <a:rPr lang="en-AU" dirty="0" smtClean="0"/>
+              <a:rPr lang="en-AU" dirty="0"/>
               <a:t>Functional Libraries are available to manage Generic Value Type Objects</a:t>
             </a:r>
-            <a:endParaRPr lang="en-AU" dirty="0"/>
           </a:p>
         </p:txBody>
       </p:sp>
@@ -12566,13 +12437,6 @@
   <p:clrMapOvr>
     <a:masterClrMapping/>
   </p:clrMapOvr>
-  <p:timing>
-    <p:tnLst>
-      <p:par>
-        <p:cTn id="1" dur="indefinite" restart="never" nodeType="tmRoot"/>
-      </p:par>
-    </p:tnLst>
-  </p:timing>
 </p:sld>
 </file>
 
@@ -12615,10 +12479,9 @@
           <a:lstStyle/>
           <a:p>
             <a:r>
-              <a:rPr lang="en-AU" dirty="0" smtClean="0"/>
+              <a:rPr lang="en-AU" dirty="0"/>
               <a:t>Functional Programming Principles</a:t>
             </a:r>
-            <a:endParaRPr lang="en-AU" dirty="0"/>
           </a:p>
         </p:txBody>
       </p:sp>
@@ -12646,33 +12509,33 @@
           <a:lstStyle/>
           <a:p>
             <a:r>
-              <a:rPr lang="en-AU" dirty="0" smtClean="0"/>
+              <a:rPr lang="en-AU" dirty="0"/>
               <a:t>Pure Functions ALWAYS return the same result when called with the same parameters</a:t>
             </a:r>
           </a:p>
           <a:p>
             <a:r>
-              <a:rPr lang="en-AU" dirty="0" smtClean="0"/>
-              <a:t>Immutability – once assigned a value cant be changed</a:t>
-            </a:r>
-          </a:p>
-          <a:p>
-            <a:r>
-              <a:rPr lang="en-AU" dirty="0" smtClean="0"/>
-              <a:t>Is Declarative – lists the steps required to reach the outcome</a:t>
-            </a:r>
-          </a:p>
-          <a:p>
-            <a:r>
-              <a:rPr lang="en-AU" dirty="0" smtClean="0"/>
-              <a:t>State is maintained through composition (joining functions together) not by shared state</a:t>
-            </a:r>
-          </a:p>
-          <a:p>
-            <a:endParaRPr lang="en-AU" dirty="0" smtClean="0"/>
-          </a:p>
-          <a:p>
-            <a:endParaRPr lang="en-AU" dirty="0" smtClean="0"/>
+              <a:rPr lang="en-AU" dirty="0"/>
+              <a:t>Immutability – once assigned a value can’t be changed</a:t>
+            </a:r>
+          </a:p>
+          <a:p>
+            <a:r>
+              <a:rPr lang="en-AU" dirty="0"/>
+              <a:t>Functional Programs are Declarative – list the steps required to reach the outcome</a:t>
+            </a:r>
+          </a:p>
+          <a:p>
+            <a:r>
+              <a:rPr lang="en-AU" dirty="0"/>
+              <a:t>State is maintained through composition (joining functions together) not by storing properties</a:t>
+            </a:r>
+          </a:p>
+          <a:p>
+            <a:endParaRPr lang="en-AU" dirty="0"/>
+          </a:p>
+          <a:p>
+            <a:endParaRPr lang="en-AU" dirty="0"/>
           </a:p>
           <a:p>
             <a:endParaRPr lang="en-AU" dirty="0"/>
@@ -12983,10 +12846,9 @@
           <a:lstStyle/>
           <a:p>
             <a:r>
-              <a:rPr lang="en-AU" dirty="0" smtClean="0"/>
+              <a:rPr lang="en-AU" dirty="0"/>
               <a:t>Benefits </a:t>
             </a:r>
-            <a:endParaRPr lang="en-AU" dirty="0"/>
           </a:p>
         </p:txBody>
       </p:sp>
@@ -13018,36 +12880,36 @@
           <a:lstStyle/>
           <a:p>
             <a:r>
-              <a:rPr lang="en-AU" dirty="0" smtClean="0"/>
+              <a:rPr lang="en-AU" dirty="0"/>
               <a:t>Predictability – you can see what will happen just by looking at the signature of the method</a:t>
             </a:r>
           </a:p>
           <a:p>
             <a:r>
-              <a:rPr lang="en-AU" dirty="0" smtClean="0"/>
+              <a:rPr lang="en-AU" dirty="0"/>
               <a:t>Brevity – (usually) functions are smaller than equivalent imperative code</a:t>
             </a:r>
           </a:p>
           <a:p>
             <a:r>
-              <a:rPr lang="en-AU" dirty="0" smtClean="0"/>
+              <a:rPr lang="en-AU" dirty="0"/>
               <a:t>Maintainability – locating bugs are typically easier (often self evident)</a:t>
             </a:r>
           </a:p>
           <a:p>
             <a:r>
-              <a:rPr lang="en-AU" dirty="0" smtClean="0"/>
+              <a:rPr lang="en-AU" dirty="0"/>
               <a:t>Testability – each “element” of the code is inherently independently testable</a:t>
             </a:r>
           </a:p>
           <a:p>
             <a:r>
-              <a:rPr lang="en-AU" dirty="0" smtClean="0"/>
+              <a:rPr lang="en-AU" dirty="0"/>
               <a:t>Parallel processing and Task queuing is much easier </a:t>
             </a:r>
           </a:p>
           <a:p>
-            <a:endParaRPr lang="en-AU" dirty="0" smtClean="0"/>
+            <a:endParaRPr lang="en-AU" dirty="0"/>
           </a:p>
           <a:p>
             <a:endParaRPr lang="en-AU" dirty="0"/>
@@ -13407,10 +13269,9 @@
           <a:lstStyle/>
           <a:p>
             <a:r>
-              <a:rPr lang="en-AU" dirty="0" smtClean="0"/>
+              <a:rPr lang="en-AU" dirty="0"/>
               <a:t>Problems </a:t>
             </a:r>
-            <a:endParaRPr lang="en-AU" dirty="0"/>
           </a:p>
         </p:txBody>
       </p:sp>
@@ -13436,27 +13297,27 @@
           <a:lstStyle/>
           <a:p>
             <a:r>
-              <a:rPr lang="en-AU" dirty="0" smtClean="0"/>
+              <a:rPr lang="en-AU" dirty="0"/>
               <a:t>Jargon – side effects, functors, high order functions …</a:t>
             </a:r>
           </a:p>
           <a:p>
             <a:r>
-              <a:rPr lang="en-AU" dirty="0" smtClean="0"/>
+              <a:rPr lang="en-AU" dirty="0"/>
               <a:t>It’s a paradigm shift for OO programmers</a:t>
             </a:r>
           </a:p>
           <a:p>
             <a:r>
-              <a:rPr lang="en-AU" dirty="0" smtClean="0"/>
+              <a:rPr lang="en-AU" dirty="0"/>
               <a:t>Immutability can be heavy on memory and requires some care (</a:t>
             </a:r>
             <a:r>
-              <a:rPr lang="en-AU" dirty="0" err="1" smtClean="0"/>
+              <a:rPr lang="en-AU" dirty="0" err="1"/>
               <a:t>eg</a:t>
             </a:r>
             <a:r>
-              <a:rPr lang="en-AU" dirty="0" smtClean="0"/>
+              <a:rPr lang="en-AU" dirty="0"/>
               <a:t> mobile devices)</a:t>
             </a:r>
           </a:p>
@@ -13728,10 +13589,9 @@
           <a:lstStyle/>
           <a:p>
             <a:r>
-              <a:rPr lang="en-AU" dirty="0" smtClean="0"/>
+              <a:rPr lang="en-AU" dirty="0"/>
               <a:t>Functional Principles in OO </a:t>
             </a:r>
-            <a:endParaRPr lang="en-AU" dirty="0"/>
           </a:p>
         </p:txBody>
       </p:sp>
@@ -13754,65 +13614,71 @@
         </p:spPr>
         <p:txBody>
           <a:bodyPr>
-            <a:normAutofit fontScale="92500" lnSpcReduction="20000"/>
+            <a:normAutofit fontScale="85000" lnSpcReduction="10000"/>
           </a:bodyPr>
           <a:lstStyle/>
           <a:p>
             <a:r>
-              <a:rPr lang="en-AU" dirty="0" smtClean="0"/>
-              <a:t>Method signature is definitive (honesty)</a:t>
+              <a:rPr lang="en-AU" dirty="0"/>
+              <a:t>Make the Method signatures definitive (honest)</a:t>
             </a:r>
           </a:p>
           <a:p>
             <a:pPr lvl="1"/>
             <a:r>
-              <a:rPr lang="en-AU" dirty="0" smtClean="0"/>
-              <a:t>The name says exactly what it does</a:t>
+              <a:rPr lang="en-AU" dirty="0"/>
+              <a:t>The name should says exactly what it does</a:t>
             </a:r>
           </a:p>
           <a:p>
             <a:pPr lvl="1"/>
             <a:r>
-              <a:rPr lang="en-AU" dirty="0" smtClean="0"/>
+              <a:rPr lang="en-AU" dirty="0"/>
               <a:t>Return type and parameter types are explicit </a:t>
             </a:r>
           </a:p>
           <a:p>
             <a:pPr lvl="1"/>
             <a:r>
-              <a:rPr lang="en-AU" dirty="0" smtClean="0"/>
+              <a:rPr lang="en-AU" dirty="0"/>
               <a:t>Eliminate side-effects</a:t>
             </a:r>
           </a:p>
           <a:p>
             <a:r>
-              <a:rPr lang="en-AU" dirty="0" smtClean="0"/>
-              <a:t>Avoiding Primitive Obsession in favour of  Value Types</a:t>
-            </a:r>
-          </a:p>
-          <a:p>
-            <a:r>
-              <a:rPr lang="en-AU" dirty="0" smtClean="0"/>
-              <a:t>Refactoring away from Exceptions to control flow</a:t>
-            </a:r>
-          </a:p>
-          <a:p>
-            <a:r>
-              <a:rPr lang="en-AU" dirty="0" smtClean="0"/>
+              <a:rPr lang="en-AU" dirty="0"/>
+              <a:t>Avoid Primitive types in favour of  Value Types</a:t>
+            </a:r>
+          </a:p>
+          <a:p>
+            <a:r>
+              <a:rPr lang="en-AU" dirty="0"/>
+              <a:t>Refactor away from using Exceptions to control flow</a:t>
+            </a:r>
+          </a:p>
+          <a:p>
+            <a:r>
+              <a:rPr lang="en-AU" dirty="0"/>
               <a:t>Functional Composition (&amp; Railway oriented programming)</a:t>
             </a:r>
           </a:p>
           <a:p>
             <a:r>
-              <a:rPr lang="en-AU" dirty="0" smtClean="0"/>
+              <a:rPr lang="en-AU" dirty="0"/>
               <a:t>(Fail Fast principle)</a:t>
             </a:r>
           </a:p>
           <a:p>
-            <a:endParaRPr lang="en-AU" dirty="0" smtClean="0"/>
-          </a:p>
-          <a:p>
-            <a:endParaRPr lang="en-AU" dirty="0" smtClean="0"/>
+            <a:r>
+              <a:rPr lang="en-AU" dirty="0"/>
+              <a:t>(Avoid returning nil)</a:t>
+            </a:r>
+          </a:p>
+          <a:p>
+            <a:endParaRPr lang="en-AU" dirty="0"/>
+          </a:p>
+          <a:p>
+            <a:endParaRPr lang="en-AU" dirty="0"/>
           </a:p>
           <a:p>
             <a:endParaRPr lang="en-AU" dirty="0"/>
@@ -14184,6 +14050,55 @@
                                           <p:spTgt spid="3">
                                             <p:txEl>
                                               <p:pRg st="7" end="7"/>
+                                            </p:txEl>
+                                          </p:spTgt>
+                                        </p:tgtEl>
+                                        <p:attrNameLst>
+                                          <p:attrName>style.visibility</p:attrName>
+                                        </p:attrNameLst>
+                                      </p:cBhvr>
+                                      <p:to>
+                                        <p:strVal val="visible"/>
+                                      </p:to>
+                                    </p:set>
+                                  </p:childTnLst>
+                                </p:cTn>
+                              </p:par>
+                            </p:childTnLst>
+                          </p:cTn>
+                        </p:par>
+                      </p:childTnLst>
+                    </p:cTn>
+                  </p:par>
+                  <p:par>
+                    <p:cTn id="31" fill="hold">
+                      <p:stCondLst>
+                        <p:cond delay="indefinite"/>
+                      </p:stCondLst>
+                      <p:childTnLst>
+                        <p:par>
+                          <p:cTn id="32" fill="hold">
+                            <p:stCondLst>
+                              <p:cond delay="0"/>
+                            </p:stCondLst>
+                            <p:childTnLst>
+                              <p:par>
+                                <p:cTn id="33" presetID="1" presetClass="entr" presetSubtype="0" fill="hold" grpId="0" nodeType="clickEffect">
+                                  <p:stCondLst>
+                                    <p:cond delay="0"/>
+                                  </p:stCondLst>
+                                  <p:childTnLst>
+                                    <p:set>
+                                      <p:cBhvr>
+                                        <p:cTn id="34" dur="1" fill="hold">
+                                          <p:stCondLst>
+                                            <p:cond delay="0"/>
+                                          </p:stCondLst>
+                                        </p:cTn>
+                                        <p:tgtEl>
+                                          <p:spTgt spid="3">
+                                            <p:txEl>
+                                              <p:pRg st="8" end="8"/>
                                             </p:txEl>
                                           </p:spTgt>
                                         </p:tgtEl>
@@ -14273,10 +14188,9 @@
           <a:lstStyle/>
           <a:p>
             <a:r>
-              <a:rPr lang="en-AU" dirty="0" smtClean="0"/>
+              <a:rPr lang="en-AU" dirty="0"/>
               <a:t>Quick Examples: Small Demonstration</a:t>
             </a:r>
-            <a:endParaRPr lang="en-AU" dirty="0"/>
           </a:p>
         </p:txBody>
       </p:sp>
@@ -14331,13 +14245,6 @@
   <p:clrMapOvr>
     <a:masterClrMapping/>
   </p:clrMapOvr>
-  <p:timing>
-    <p:tnLst>
-      <p:par>
-        <p:cTn id="1" dur="indefinite" restart="never" nodeType="tmRoot"/>
-      </p:par>
-    </p:tnLst>
-  </p:timing>
 </p:sld>
 </file>
 
@@ -14382,10 +14289,9 @@
           <a:lstStyle/>
           <a:p>
             <a:r>
-              <a:rPr lang="en-AU" dirty="0" smtClean="0"/>
-              <a:t>Functional Principles in OO </a:t>
-            </a:r>
-            <a:endParaRPr lang="en-AU" dirty="0"/>
+              <a:rPr lang="en-AU" dirty="0"/>
+              <a:t>CSV Updater Project </a:t>
+            </a:r>
           </a:p>
         </p:txBody>
       </p:sp>
@@ -14400,6 +14306,10 @@
           </p:nvPr>
         </p:nvSpPr>
         <p:spPr>
+          <a:xfrm>
+            <a:off x="457200" y="1600200"/>
+            <a:ext cx="8229600" cy="5141168"/>
+          </a:xfrm>
           <a:solidFill>
             <a:schemeClr val="bg1">
               <a:alpha val="60000"/>
@@ -14408,65 +14318,53 @@
         </p:spPr>
         <p:txBody>
           <a:bodyPr>
-            <a:normAutofit fontScale="92500" lnSpcReduction="10000"/>
+            <a:normAutofit fontScale="85000" lnSpcReduction="10000"/>
           </a:bodyPr>
           <a:lstStyle/>
           <a:p>
             <a:r>
-              <a:rPr lang="en-AU" dirty="0" smtClean="0"/>
-              <a:t>Method signature is definitive (honesty)</a:t>
-            </a:r>
-          </a:p>
-          <a:p>
-            <a:pPr lvl="1"/>
-            <a:r>
-              <a:rPr lang="en-AU" dirty="0" smtClean="0"/>
-              <a:t>The name says exactly what it does</a:t>
-            </a:r>
-          </a:p>
-          <a:p>
-            <a:pPr lvl="1"/>
-            <a:r>
-              <a:rPr lang="en-AU" dirty="0" smtClean="0"/>
-              <a:t>Return type and parameter Types are explicit </a:t>
-            </a:r>
-          </a:p>
-          <a:p>
-            <a:pPr lvl="1"/>
-            <a:r>
-              <a:rPr lang="en-AU" dirty="0" smtClean="0"/>
-              <a:t>Eliminate side-effects</a:t>
-            </a:r>
-          </a:p>
-          <a:p>
-            <a:r>
-              <a:rPr lang="en-AU" dirty="0" smtClean="0"/>
-              <a:t>Avoiding Primitive Obsession and Value Types</a:t>
-            </a:r>
-          </a:p>
-          <a:p>
-            <a:r>
-              <a:rPr lang="en-AU" dirty="0" smtClean="0"/>
-              <a:t>Refactoring away from Exceptions to control flow</a:t>
-            </a:r>
-          </a:p>
-          <a:p>
-            <a:r>
-              <a:rPr lang="en-AU" dirty="0" smtClean="0"/>
-              <a:t>Functional Composition (&amp; Railway oriented programming)</a:t>
-            </a:r>
-          </a:p>
-          <a:p>
-            <a:r>
-              <a:rPr lang="en-AU" dirty="0" smtClean="0"/>
-              <a:t>(Fail Fast)</a:t>
-            </a:r>
-          </a:p>
-          <a:p>
-            <a:endParaRPr lang="en-AU" dirty="0" smtClean="0"/>
-          </a:p>
-          <a:p>
-            <a:endParaRPr lang="en-AU" dirty="0" smtClean="0"/>
+              <a:rPr lang="en-AU" dirty="0" err="1"/>
+              <a:t>CSVUpdater</a:t>
+            </a:r>
+            <a:r>
+              <a:rPr lang="en-AU" dirty="0"/>
+              <a:t> is a demo project I thought might be a good way to demonstrate functional programming. </a:t>
+            </a:r>
+          </a:p>
+          <a:p>
+            <a:r>
+              <a:rPr lang="en-AU" dirty="0"/>
+              <a:t>Key points are that CSV files are often implemented wrongly (CRLF can be used in DATA)</a:t>
+            </a:r>
+          </a:p>
+          <a:p>
+            <a:r>
+              <a:rPr lang="en-AU" dirty="0"/>
+              <a:t>Starts with purely OO approach and eventually will end up with as functional as we can make it</a:t>
+            </a:r>
+          </a:p>
+          <a:p>
+            <a:r>
+              <a:rPr lang="en-AU" dirty="0"/>
+              <a:t>Part 1 deals with immutability and just some aspects of code honesty – long way to go</a:t>
+            </a:r>
+          </a:p>
+          <a:p>
+            <a:r>
+              <a:rPr lang="en-AU" dirty="0"/>
+              <a:t>Want to reach a point where the original </a:t>
+            </a:r>
+            <a:r>
+              <a:rPr lang="en-AU" dirty="0" err="1"/>
+              <a:t>CSVUpdater</a:t>
+            </a:r>
+            <a:r>
+              <a:rPr lang="en-AU" dirty="0"/>
+              <a:t> becomes to be agnostic of format and data source (Tab delimited, Web source, In memory) and can be safely run in a parallel processing environment. </a:t>
+            </a:r>
+          </a:p>
+          <a:p>
+            <a:endParaRPr lang="en-AU" dirty="0"/>
           </a:p>
           <a:p>
             <a:endParaRPr lang="en-AU" dirty="0"/>
@@ -14563,45 +14461,32 @@
                                   </p:childTnLst>
                                 </p:cTn>
                               </p:par>
+                            </p:childTnLst>
+                          </p:cTn>
+                        </p:par>
+                      </p:childTnLst>
+                    </p:cTn>
+                  </p:par>
+                  <p:par>
+                    <p:cTn id="9" fill="hold">
+                      <p:stCondLst>
+                        <p:cond delay="indefinite"/>
+                      </p:stCondLst>
+                      <p:childTnLst>
+                        <p:par>
+                          <p:cTn id="10" fill="hold">
+                            <p:stCondLst>
+                              <p:cond delay="0"/>
+                            </p:stCondLst>
+                            <p:childTnLst>
                               <p:par>
-                                <p:cTn id="9" presetID="1" presetClass="entr" presetSubtype="0" fill="hold" grpId="0" nodeType="withEffect">
+                                <p:cTn id="11" presetID="1" presetClass="entr" presetSubtype="0" fill="hold" grpId="0" nodeType="clickEffect">
                                   <p:stCondLst>
                                     <p:cond delay="0"/>
                                   </p:stCondLst>
                                   <p:childTnLst>
                                     <p:set>
                                       <p:cBhvr>
-                                        <p:cTn id="10" dur="1" fill="hold">
-                                          <p:stCondLst>
-                                            <p:cond delay="0"/>
-                                          </p:stCondLst>
-                                        </p:cTn>
-                                        <p:tgtEl>
-                                          <p:spTgt spid="3">
-                                            <p:txEl>
-                                              <p:pRg st="1" end="1"/>
-                                            </p:txEl>
-                                          </p:spTgt>
-                                        </p:tgtEl>
-                                        <p:attrNameLst>
-                                          <p:attrName>style.visibility</p:attrName>
-                                        </p:attrNameLst>
-                                      </p:cBhvr>
-                                      <p:to>
-                                        <p:strVal val="visible"/>
-                                      </p:to>
-                                    </p:set>
-                                  </p:childTnLst>
-                                </p:cTn>
-                              </p:par>
-                              <p:par>
-                                <p:cTn id="11" presetID="1" presetClass="entr" presetSubtype="0" fill="hold" grpId="0" nodeType="withEffect">
-                                  <p:stCondLst>
-                                    <p:cond delay="0"/>
-                                  </p:stCondLst>
-                                  <p:childTnLst>
-                                    <p:set>
-                                      <p:cBhvr>
                                         <p:cTn id="12" dur="1" fill="hold">
                                           <p:stCondLst>
                                             <p:cond delay="0"/>
@@ -14610,38 +14495,7 @@
                                         <p:tgtEl>
                                           <p:spTgt spid="3">
                                             <p:txEl>
-                                              <p:pRg st="2" end="2"/>
-                                            </p:txEl>
-                                          </p:spTgt>
-                                        </p:tgtEl>
-                                        <p:attrNameLst>
-                                          <p:attrName>style.visibility</p:attrName>
-                                        </p:attrNameLst>
-                                      </p:cBhvr>
-                                      <p:to>
-                                        <p:strVal val="visible"/>
-                                      </p:to>
-                                    </p:set>
-                                  </p:childTnLst>
-                                </p:cTn>
-                              </p:par>
-                              <p:par>
-                                <p:cTn id="13" presetID="1" presetClass="entr" presetSubtype="0" fill="hold" grpId="0" nodeType="withEffect">
-                                  <p:stCondLst>
-                                    <p:cond delay="0"/>
-                                  </p:stCondLst>
-                                  <p:childTnLst>
-                                    <p:set>
-                                      <p:cBhvr>
-                                        <p:cTn id="14" dur="1" fill="hold">
-                                          <p:stCondLst>
-                                            <p:cond delay="0"/>
-                                          </p:stCondLst>
-                                        </p:cTn>
-                                        <p:tgtEl>
-                                          <p:spTgt spid="3">
-                                            <p:txEl>
-                                              <p:pRg st="3" end="3"/>
+                                              <p:pRg st="1" end="1"/>
                                             </p:txEl>
                                           </p:spTgt>
                                         </p:tgtEl>
@@ -14663,26 +14517,26 @@
                     </p:cTn>
                   </p:par>
                   <p:par>
-                    <p:cTn id="15" fill="hold">
+                    <p:cTn id="13" fill="hold">
                       <p:stCondLst>
                         <p:cond delay="indefinite"/>
                       </p:stCondLst>
                       <p:childTnLst>
                         <p:par>
-                          <p:cTn id="16" fill="hold">
+                          <p:cTn id="14" fill="hold">
                             <p:stCondLst>
                               <p:cond delay="0"/>
                             </p:stCondLst>
                             <p:childTnLst>
                               <p:par>
-                                <p:cTn id="17" presetID="1" presetClass="entr" presetSubtype="0" fill="hold" grpId="0" nodeType="clickEffect">
+                                <p:cTn id="15" presetID="1" presetClass="entr" presetSubtype="0" fill="hold" grpId="0" nodeType="clickEffect">
                                   <p:stCondLst>
                                     <p:cond delay="0"/>
                                   </p:stCondLst>
                                   <p:childTnLst>
                                     <p:set>
                                       <p:cBhvr>
-                                        <p:cTn id="18" dur="1" fill="hold">
+                                        <p:cTn id="16" dur="1" fill="hold">
                                           <p:stCondLst>
                                             <p:cond delay="0"/>
                                           </p:stCondLst>
@@ -14690,7 +14544,7 @@
                                         <p:tgtEl>
                                           <p:spTgt spid="3">
                                             <p:txEl>
-                                              <p:pRg st="4" end="4"/>
+                                              <p:pRg st="2" end="2"/>
                                             </p:txEl>
                                           </p:spTgt>
                                         </p:tgtEl>
@@ -14712,26 +14566,26 @@
                     </p:cTn>
                   </p:par>
                   <p:par>
-                    <p:cTn id="19" fill="hold">
+                    <p:cTn id="17" fill="hold">
                       <p:stCondLst>
                         <p:cond delay="indefinite"/>
                       </p:stCondLst>
                       <p:childTnLst>
                         <p:par>
-                          <p:cTn id="20" fill="hold">
+                          <p:cTn id="18" fill="hold">
                             <p:stCondLst>
                               <p:cond delay="0"/>
                             </p:stCondLst>
                             <p:childTnLst>
                               <p:par>
-                                <p:cTn id="21" presetID="1" presetClass="entr" presetSubtype="0" fill="hold" grpId="0" nodeType="clickEffect">
+                                <p:cTn id="19" presetID="1" presetClass="entr" presetSubtype="0" fill="hold" grpId="0" nodeType="clickEffect">
                                   <p:stCondLst>
                                     <p:cond delay="0"/>
                                   </p:stCondLst>
                                   <p:childTnLst>
                                     <p:set>
                                       <p:cBhvr>
-                                        <p:cTn id="22" dur="1" fill="hold">
+                                        <p:cTn id="20" dur="1" fill="hold">
                                           <p:stCondLst>
                                             <p:cond delay="0"/>
                                           </p:stCondLst>
@@ -14739,7 +14593,7 @@
                                         <p:tgtEl>
                                           <p:spTgt spid="3">
                                             <p:txEl>
-                                              <p:pRg st="5" end="5"/>
+                                              <p:pRg st="3" end="3"/>
                                             </p:txEl>
                                           </p:spTgt>
                                         </p:tgtEl>
@@ -14761,26 +14615,26 @@
                     </p:cTn>
                   </p:par>
                   <p:par>
-                    <p:cTn id="23" fill="hold">
+                    <p:cTn id="21" fill="hold">
                       <p:stCondLst>
                         <p:cond delay="indefinite"/>
                       </p:stCondLst>
                       <p:childTnLst>
                         <p:par>
-                          <p:cTn id="24" fill="hold">
+                          <p:cTn id="22" fill="hold">
                             <p:stCondLst>
                               <p:cond delay="0"/>
                             </p:stCondLst>
                             <p:childTnLst>
                               <p:par>
-                                <p:cTn id="25" presetID="1" presetClass="entr" presetSubtype="0" fill="hold" grpId="0" nodeType="clickEffect">
+                                <p:cTn id="23" presetID="1" presetClass="entr" presetSubtype="0" fill="hold" grpId="0" nodeType="clickEffect">
                                   <p:stCondLst>
                                     <p:cond delay="0"/>
                                   </p:stCondLst>
                                   <p:childTnLst>
                                     <p:set>
                                       <p:cBhvr>
-                                        <p:cTn id="26" dur="1" fill="hold">
+                                        <p:cTn id="24" dur="1" fill="hold">
                                           <p:stCondLst>
                                             <p:cond delay="0"/>
                                           </p:stCondLst>
@@ -14788,56 +14642,7 @@
                                         <p:tgtEl>
                                           <p:spTgt spid="3">
                                             <p:txEl>
-                                              <p:pRg st="6" end="6"/>
-                                            </p:txEl>
-                                          </p:spTgt>
-                                        </p:tgtEl>
-                                        <p:attrNameLst>
-                                          <p:attrName>style.visibility</p:attrName>
-                                        </p:attrNameLst>
-                                      </p:cBhvr>
-                                      <p:to>
-                                        <p:strVal val="visible"/>
-                                      </p:to>
-                                    </p:set>
-                                  </p:childTnLst>
-                                </p:cTn>
-                              </p:par>
-                            </p:childTnLst>
-                          </p:cTn>
-                        </p:par>
-                      </p:childTnLst>
-                    </p:cTn>
-                  </p:par>
-                  <p:par>
-                    <p:cTn id="27" fill="hold">
-                      <p:stCondLst>
-                        <p:cond delay="indefinite"/>
-                      </p:stCondLst>
-                      <p:childTnLst>
-                        <p:par>
-                          <p:cTn id="28" fill="hold">
-                            <p:stCondLst>
-                              <p:cond delay="0"/>
-                            </p:stCondLst>
-                            <p:childTnLst>
-                              <p:par>
-                                <p:cTn id="29" presetID="1" presetClass="entr" presetSubtype="0" fill="hold" grpId="0" nodeType="clickEffect">
-                                  <p:stCondLst>
-                                    <p:cond delay="0"/>
-                                  </p:stCondLst>
-                                  <p:childTnLst>
-                                    <p:set>
-                                      <p:cBhvr>
-                                        <p:cTn id="30" dur="1" fill="hold">
-                                          <p:stCondLst>
-                                            <p:cond delay="0"/>
-                                          </p:stCondLst>
-                                        </p:cTn>
-                                        <p:tgtEl>
-                                          <p:spTgt spid="3">
-                                            <p:txEl>
-                                              <p:pRg st="7" end="7"/>
+                                              <p:pRg st="4" end="4"/>
                                             </p:txEl>
                                           </p:spTgt>
                                         </p:tgtEl>
@@ -14880,7 +14685,7 @@
       </p:par>
     </p:tnLst>
     <p:bldLst>
-      <p:bldP spid="3" grpId="0" build="p" animBg="1"/>
+      <p:bldP spid="3" grpId="0" uiExpand="1" build="p" animBg="1"/>
     </p:bldLst>
   </p:timing>
 </p:sld>
@@ -14927,10 +14732,9 @@
           <a:lstStyle/>
           <a:p>
             <a:r>
-              <a:rPr lang="en-AU" dirty="0" smtClean="0"/>
+              <a:rPr lang="en-AU" dirty="0"/>
               <a:t>Large Demonstration</a:t>
             </a:r>
-            <a:endParaRPr lang="en-AU" dirty="0"/>
           </a:p>
         </p:txBody>
       </p:sp>
@@ -14985,13 +14789,6 @@
   <p:clrMapOvr>
     <a:masterClrMapping/>
   </p:clrMapOvr>
-  <p:timing>
-    <p:tnLst>
-      <p:par>
-        <p:cTn id="1" dur="indefinite" restart="never" nodeType="tmRoot"/>
-      </p:par>
-    </p:tnLst>
-  </p:timing>
 </p:sld>
 </file>
 
@@ -15103,10 +14900,9 @@
           </a:lstStyle>
           <a:p>
             <a:r>
-              <a:rPr lang="en-AU" dirty="0" smtClean="0"/>
+              <a:rPr lang="en-AU" dirty="0"/>
               <a:t>Class Changes</a:t>
             </a:r>
-            <a:endParaRPr lang="en-AU" dirty="0"/>
           </a:p>
         </p:txBody>
       </p:sp>
@@ -15180,13 +14976,6 @@
   <p:clrMapOvr>
     <a:masterClrMapping/>
   </p:clrMapOvr>
-  <p:timing>
-    <p:tnLst>
-      <p:par>
-        <p:cTn id="1" dur="indefinite" restart="never" nodeType="tmRoot"/>
-      </p:par>
-    </p:tnLst>
-  </p:timing>
 </p:sld>
 </file>
 

</xml_diff>